<commit_message>
Update pptx - fix errors
</commit_message>
<xml_diff>
--- a/ProjInf_AI_Driving_Classification.pptx
+++ b/ProjInf_AI_Driving_Classification.pptx
@@ -4976,7 +4976,10 @@
           <a:bodyPr/>
           <a:lstStyle/>
           <a:p>
-            <a:endParaRPr lang="pt-PT" dirty="0"/>
+            <a:r>
+              <a:rPr lang="pt-PT" dirty="0"/>
+              <a:t>Vou descrever o fluxo de dados desde a captura até ao treino e teste do modelo.</a:t>
+            </a:r>
           </a:p>
         </p:txBody>
       </p:sp>
@@ -12576,7 +12579,6 @@
           <a:schemeClr val="accent2">
             <a:lumMod val="20000"/>
             <a:lumOff val="80000"/>
-            <a:alpha val="80000"/>
           </a:schemeClr>
         </a:solidFill>
         <a:effectLst/>
@@ -12614,7 +12616,7 @@
         </p:nvSpPr>
         <p:spPr>
           <a:xfrm>
-            <a:off x="1860797" y="2841668"/>
+            <a:off x="1860797" y="2475907"/>
             <a:ext cx="8470406" cy="1023020"/>
           </a:xfrm>
         </p:spPr>
@@ -12884,6 +12886,69 @@
               </a:rPr>
               <a:t>Orientadores</a:t>
             </a:r>
+          </a:p>
+        </p:txBody>
+      </p:sp>
+      <p:sp>
+        <p:nvSpPr>
+          <p:cNvPr id="6" name="Title 1">
+            <a:extLst>
+              <a:ext uri="{FF2B5EF4-FFF2-40B4-BE49-F238E27FC236}">
+                <a16:creationId xmlns:a16="http://schemas.microsoft.com/office/drawing/2014/main" id="{9DF16CF6-D953-E1A4-7403-8826ECC1D428}"/>
+              </a:ext>
+            </a:extLst>
+          </p:cNvPr>
+          <p:cNvSpPr txBox="1">
+            <a:spLocks/>
+          </p:cNvSpPr>
+          <p:nvPr/>
+        </p:nvSpPr>
+        <p:spPr>
+          <a:xfrm>
+            <a:off x="5475117" y="3429000"/>
+            <a:ext cx="1241765" cy="692441"/>
+          </a:xfrm>
+          <a:prstGeom prst="rect">
+            <a:avLst/>
+          </a:prstGeom>
+        </p:spPr>
+        <p:txBody>
+          <a:bodyPr vert="horz" lIns="91440" tIns="45720" rIns="91440" bIns="45720" rtlCol="0" anchor="b">
+            <a:noAutofit/>
+          </a:bodyPr>
+          <a:lstStyle>
+            <a:lvl1pPr algn="l" defTabSz="914400" rtl="0" eaLnBrk="1" latinLnBrk="0" hangingPunct="1">
+              <a:lnSpc>
+                <a:spcPct val="90000"/>
+              </a:lnSpc>
+              <a:spcBef>
+                <a:spcPct val="0"/>
+              </a:spcBef>
+              <a:buNone/>
+              <a:defRPr sz="6000" kern="1200">
+                <a:solidFill>
+                  <a:schemeClr val="bg1"/>
+                </a:solidFill>
+                <a:latin typeface="+mj-lt"/>
+                <a:ea typeface="+mj-ea"/>
+                <a:cs typeface="+mj-cs"/>
+              </a:defRPr>
+            </a:lvl1pPr>
+          </a:lstStyle>
+          <a:p>
+            <a:r>
+              <a:rPr lang="en-US" sz="3200" dirty="0">
+                <a:solidFill>
+                  <a:schemeClr val="tx1"/>
+                </a:solidFill>
+              </a:rPr>
+              <a:t>LSTM</a:t>
+            </a:r>
+            <a:endParaRPr lang="pt-PT" sz="3200" dirty="0">
+              <a:solidFill>
+                <a:schemeClr val="tx1"/>
+              </a:solidFill>
+            </a:endParaRPr>
           </a:p>
         </p:txBody>
       </p:sp>
@@ -13195,6 +13260,51 @@
                       </p:childTnLst>
                     </p:cTn>
                   </p:par>
+                  <p:par>
+                    <p:cTn id="25" fill="hold">
+                      <p:stCondLst>
+                        <p:cond delay="indefinite"/>
+                      </p:stCondLst>
+                      <p:childTnLst>
+                        <p:par>
+                          <p:cTn id="26" fill="hold">
+                            <p:stCondLst>
+                              <p:cond delay="0"/>
+                            </p:stCondLst>
+                            <p:childTnLst>
+                              <p:par>
+                                <p:cTn id="27" presetID="1" presetClass="entr" presetSubtype="0" fill="hold" grpId="0" nodeType="clickEffect">
+                                  <p:stCondLst>
+                                    <p:cond delay="0"/>
+                                  </p:stCondLst>
+                                  <p:childTnLst>
+                                    <p:set>
+                                      <p:cBhvr>
+                                        <p:cTn id="28" dur="1" fill="hold">
+                                          <p:stCondLst>
+                                            <p:cond delay="0"/>
+                                          </p:stCondLst>
+                                        </p:cTn>
+                                        <p:tgtEl>
+                                          <p:spTgt spid="6"/>
+                                        </p:tgtEl>
+                                        <p:attrNameLst>
+                                          <p:attrName>style.visibility</p:attrName>
+                                        </p:attrNameLst>
+                                      </p:cBhvr>
+                                      <p:to>
+                                        <p:strVal val="visible"/>
+                                      </p:to>
+                                    </p:set>
+                                  </p:childTnLst>
+                                </p:cTn>
+                              </p:par>
+                            </p:childTnLst>
+                          </p:cTn>
+                        </p:par>
+                      </p:childTnLst>
+                    </p:cTn>
+                  </p:par>
                 </p:childTnLst>
               </p:cTn>
               <p:prevCondLst>
@@ -13220,6 +13330,7 @@
       <p:bldP spid="2" grpId="0"/>
       <p:bldP spid="4" grpId="0"/>
       <p:bldP spid="9" grpId="0"/>
+      <p:bldP spid="6" grpId="0"/>
     </p:bldLst>
   </p:timing>
 </p:sld>
@@ -14348,13 +14459,8 @@
             <a:pPr algn="ctr"/>
             <a:r>
               <a:rPr lang="pt-PT" sz="1000" dirty="0"/>
-              <a:t>Gráfico de manobras do </a:t>
-            </a:r>
-            <a:r>
-              <a:rPr lang="pt-PT" sz="1000" dirty="0" err="1"/>
-              <a:t>dataset</a:t>
-            </a:r>
-            <a:endParaRPr lang="pt-PT" sz="1000" dirty="0"/>
+              <a:t>Gráfico de manobras Abrantes-Leiria.</a:t>
+            </a:r>
           </a:p>
         </p:txBody>
       </p:sp>
@@ -14946,14 +15052,13 @@
         </p:nvPicPr>
         <p:blipFill>
           <a:blip r:embed="rId4"/>
-          <a:stretch>
-            <a:fillRect/>
-          </a:stretch>
+          <a:srcRect l="2514" t="4303" r="4562"/>
+          <a:stretch/>
         </p:blipFill>
         <p:spPr>
           <a:xfrm>
-            <a:off x="3252717" y="729001"/>
-            <a:ext cx="5686565" cy="5168352"/>
+            <a:off x="3253339" y="823197"/>
+            <a:ext cx="5284200" cy="4945908"/>
           </a:xfrm>
           <a:prstGeom prst="rect">
             <a:avLst/>
@@ -15106,6 +15211,42 @@
           </a:p>
         </p:txBody>
       </p:sp>
+      <p:sp>
+        <p:nvSpPr>
+          <p:cNvPr id="2" name="TextBox 1">
+            <a:extLst>
+              <a:ext uri="{FF2B5EF4-FFF2-40B4-BE49-F238E27FC236}">
+                <a16:creationId xmlns:a16="http://schemas.microsoft.com/office/drawing/2014/main" id="{766352C7-D3F9-0AD5-2EBB-AB95266C2446}"/>
+              </a:ext>
+            </a:extLst>
+          </p:cNvPr>
+          <p:cNvSpPr txBox="1"/>
+          <p:nvPr/>
+        </p:nvSpPr>
+        <p:spPr>
+          <a:xfrm>
+            <a:off x="4101811" y="5830907"/>
+            <a:ext cx="4114799" cy="246221"/>
+          </a:xfrm>
+          <a:prstGeom prst="rect">
+            <a:avLst/>
+          </a:prstGeom>
+          <a:noFill/>
+        </p:spPr>
+        <p:txBody>
+          <a:bodyPr wrap="square" rtlCol="0">
+            <a:spAutoFit/>
+          </a:bodyPr>
+          <a:lstStyle/>
+          <a:p>
+            <a:pPr algn="ctr"/>
+            <a:r>
+              <a:rPr lang="pt-PT" sz="1000" dirty="0"/>
+              <a:t>Diagrama ilustrativo do tratamento dos dados.</a:t>
+            </a:r>
+          </a:p>
+        </p:txBody>
+      </p:sp>
     </p:spTree>
     <p:extLst>
       <p:ext uri="{BB962C8B-B14F-4D97-AF65-F5344CB8AC3E}">
@@ -15116,6 +15257,87 @@
   <p:clrMapOvr>
     <a:masterClrMapping/>
   </p:clrMapOvr>
+  <p:timing>
+    <p:tnLst>
+      <p:par>
+        <p:cTn id="1" dur="indefinite" restart="never" nodeType="tmRoot">
+          <p:childTnLst>
+            <p:seq concurrent="1" nextAc="seek">
+              <p:cTn id="2" dur="indefinite" nodeType="mainSeq">
+                <p:childTnLst>
+                  <p:par>
+                    <p:cTn id="3" fill="hold">
+                      <p:stCondLst>
+                        <p:cond delay="indefinite"/>
+                        <p:cond evt="onBegin" delay="0">
+                          <p:tn val="2"/>
+                        </p:cond>
+                      </p:stCondLst>
+                      <p:childTnLst>
+                        <p:par>
+                          <p:cTn id="4" fill="hold">
+                            <p:stCondLst>
+                              <p:cond delay="0"/>
+                            </p:stCondLst>
+                            <p:childTnLst>
+                              <p:par>
+                                <p:cTn id="5" presetID="1" presetClass="entr" presetSubtype="0" fill="hold" grpId="0" nodeType="withEffect">
+                                  <p:stCondLst>
+                                    <p:cond delay="0"/>
+                                  </p:stCondLst>
+                                  <p:childTnLst>
+                                    <p:set>
+                                      <p:cBhvr>
+                                        <p:cTn id="6" dur="1" fill="hold">
+                                          <p:stCondLst>
+                                            <p:cond delay="0"/>
+                                          </p:stCondLst>
+                                        </p:cTn>
+                                        <p:tgtEl>
+                                          <p:spTgt spid="2"/>
+                                        </p:tgtEl>
+                                        <p:attrNameLst>
+                                          <p:attrName>style.visibility</p:attrName>
+                                        </p:attrNameLst>
+                                      </p:cBhvr>
+                                      <p:to>
+                                        <p:strVal val="visible"/>
+                                      </p:to>
+                                    </p:set>
+                                  </p:childTnLst>
+                                </p:cTn>
+                              </p:par>
+                            </p:childTnLst>
+                          </p:cTn>
+                        </p:par>
+                      </p:childTnLst>
+                    </p:cTn>
+                  </p:par>
+                </p:childTnLst>
+              </p:cTn>
+              <p:prevCondLst>
+                <p:cond evt="onPrev" delay="0">
+                  <p:tgtEl>
+                    <p:sldTgt/>
+                  </p:tgtEl>
+                </p:cond>
+              </p:prevCondLst>
+              <p:nextCondLst>
+                <p:cond evt="onNext" delay="0">
+                  <p:tgtEl>
+                    <p:sldTgt/>
+                  </p:tgtEl>
+                </p:cond>
+              </p:nextCondLst>
+            </p:seq>
+          </p:childTnLst>
+        </p:cTn>
+      </p:par>
+    </p:tnLst>
+    <p:bldLst>
+      <p:bldP spid="2" grpId="0"/>
+    </p:bldLst>
+  </p:timing>
 </p:sld>
 </file>
 
@@ -15570,7 +15792,7 @@
         </p:nvSpPr>
         <p:spPr>
           <a:xfrm>
-            <a:off x="4101811" y="5792407"/>
+            <a:off x="4101811" y="5830907"/>
             <a:ext cx="4114799" cy="246221"/>
           </a:xfrm>
           <a:prstGeom prst="rect">
@@ -15586,10 +15808,9 @@
           <a:p>
             <a:pPr algn="ctr"/>
             <a:r>
-              <a:rPr lang="pt-PT" sz="1000"/>
+              <a:rPr lang="pt-PT" sz="1000" dirty="0"/>
               <a:t>Diagrama ilustrativo do tratamento dos dados.</a:t>
             </a:r>
-            <a:endParaRPr lang="pt-PT" sz="1000" dirty="0"/>
           </a:p>
         </p:txBody>
       </p:sp>
@@ -16110,20 +16331,55 @@
         </p:nvPicPr>
         <p:blipFill>
           <a:blip r:embed="rId4"/>
-          <a:stretch>
-            <a:fillRect/>
-          </a:stretch>
+          <a:srcRect l="-3684" t="3665" r="2757"/>
+          <a:stretch/>
         </p:blipFill>
         <p:spPr>
           <a:xfrm>
-            <a:off x="3858400" y="793005"/>
-            <a:ext cx="4930653" cy="5150596"/>
+            <a:off x="3521241" y="819372"/>
+            <a:ext cx="4940765" cy="4926430"/>
           </a:xfrm>
           <a:prstGeom prst="rect">
             <a:avLst/>
           </a:prstGeom>
         </p:spPr>
       </p:pic>
+      <p:sp>
+        <p:nvSpPr>
+          <p:cNvPr id="2" name="TextBox 1">
+            <a:extLst>
+              <a:ext uri="{FF2B5EF4-FFF2-40B4-BE49-F238E27FC236}">
+                <a16:creationId xmlns:a16="http://schemas.microsoft.com/office/drawing/2014/main" id="{ACFA6DC6-7E9B-7EEC-2A82-C82D2D689436}"/>
+              </a:ext>
+            </a:extLst>
+          </p:cNvPr>
+          <p:cNvSpPr txBox="1"/>
+          <p:nvPr/>
+        </p:nvSpPr>
+        <p:spPr>
+          <a:xfrm>
+            <a:off x="4101811" y="5830907"/>
+            <a:ext cx="4114799" cy="246221"/>
+          </a:xfrm>
+          <a:prstGeom prst="rect">
+            <a:avLst/>
+          </a:prstGeom>
+          <a:noFill/>
+        </p:spPr>
+        <p:txBody>
+          <a:bodyPr wrap="square" rtlCol="0">
+            <a:spAutoFit/>
+          </a:bodyPr>
+          <a:lstStyle/>
+          <a:p>
+            <a:pPr algn="ctr"/>
+            <a:r>
+              <a:rPr lang="pt-PT" sz="1000" dirty="0"/>
+              <a:t>Diagrama ilustrativo do tratamento dos dados.</a:t>
+            </a:r>
+          </a:p>
+        </p:txBody>
+      </p:sp>
     </p:spTree>
     <p:extLst>
       <p:ext uri="{BB962C8B-B14F-4D97-AF65-F5344CB8AC3E}">
@@ -16134,6 +16390,87 @@
   <p:clrMapOvr>
     <a:masterClrMapping/>
   </p:clrMapOvr>
+  <p:timing>
+    <p:tnLst>
+      <p:par>
+        <p:cTn id="1" dur="indefinite" restart="never" nodeType="tmRoot">
+          <p:childTnLst>
+            <p:seq concurrent="1" nextAc="seek">
+              <p:cTn id="2" dur="indefinite" nodeType="mainSeq">
+                <p:childTnLst>
+                  <p:par>
+                    <p:cTn id="3" fill="hold">
+                      <p:stCondLst>
+                        <p:cond delay="indefinite"/>
+                        <p:cond evt="onBegin" delay="0">
+                          <p:tn val="2"/>
+                        </p:cond>
+                      </p:stCondLst>
+                      <p:childTnLst>
+                        <p:par>
+                          <p:cTn id="4" fill="hold">
+                            <p:stCondLst>
+                              <p:cond delay="0"/>
+                            </p:stCondLst>
+                            <p:childTnLst>
+                              <p:par>
+                                <p:cTn id="5" presetID="1" presetClass="entr" presetSubtype="0" fill="hold" grpId="0" nodeType="withEffect">
+                                  <p:stCondLst>
+                                    <p:cond delay="0"/>
+                                  </p:stCondLst>
+                                  <p:childTnLst>
+                                    <p:set>
+                                      <p:cBhvr>
+                                        <p:cTn id="6" dur="1" fill="hold">
+                                          <p:stCondLst>
+                                            <p:cond delay="0"/>
+                                          </p:stCondLst>
+                                        </p:cTn>
+                                        <p:tgtEl>
+                                          <p:spTgt spid="2"/>
+                                        </p:tgtEl>
+                                        <p:attrNameLst>
+                                          <p:attrName>style.visibility</p:attrName>
+                                        </p:attrNameLst>
+                                      </p:cBhvr>
+                                      <p:to>
+                                        <p:strVal val="visible"/>
+                                      </p:to>
+                                    </p:set>
+                                  </p:childTnLst>
+                                </p:cTn>
+                              </p:par>
+                            </p:childTnLst>
+                          </p:cTn>
+                        </p:par>
+                      </p:childTnLst>
+                    </p:cTn>
+                  </p:par>
+                </p:childTnLst>
+              </p:cTn>
+              <p:prevCondLst>
+                <p:cond evt="onPrev" delay="0">
+                  <p:tgtEl>
+                    <p:sldTgt/>
+                  </p:tgtEl>
+                </p:cond>
+              </p:prevCondLst>
+              <p:nextCondLst>
+                <p:cond evt="onNext" delay="0">
+                  <p:tgtEl>
+                    <p:sldTgt/>
+                  </p:tgtEl>
+                </p:cond>
+              </p:nextCondLst>
+            </p:seq>
+          </p:childTnLst>
+        </p:cTn>
+      </p:par>
+    </p:tnLst>
+    <p:bldLst>
+      <p:bldP spid="2" grpId="0"/>
+    </p:bldLst>
+  </p:timing>
 </p:sld>
 </file>
 
@@ -16560,14 +16897,13 @@
         </p:nvPicPr>
         <p:blipFill>
           <a:blip r:embed="rId4"/>
-          <a:stretch>
-            <a:fillRect/>
-          </a:stretch>
+          <a:srcRect l="2848" r="3850"/>
+          <a:stretch/>
         </p:blipFill>
         <p:spPr>
           <a:xfrm>
-            <a:off x="3377689" y="1007110"/>
-            <a:ext cx="5436621" cy="4843780"/>
+            <a:off x="3578993" y="917647"/>
+            <a:ext cx="5072514" cy="4843780"/>
           </a:xfrm>
           <a:prstGeom prst="rect">
             <a:avLst/>
@@ -16588,7 +16924,7 @@
         </p:nvSpPr>
         <p:spPr>
           <a:xfrm>
-            <a:off x="4101811" y="5792407"/>
+            <a:off x="4101811" y="5830907"/>
             <a:ext cx="4114799" cy="246221"/>
           </a:xfrm>
           <a:prstGeom prst="rect">
@@ -18278,7 +18614,7 @@
               <a:t>Comparação da </a:t>
             </a:r>
             <a:r>
-              <a:rPr lang="pt-PT" sz="1000" dirty="0" err="1"/>
+              <a:rPr lang="pt-PT" sz="1000" i="1" dirty="0" err="1"/>
               <a:t>loss</a:t>
             </a:r>
             <a:r>
@@ -18287,19 +18623,23 @@
             </a:r>
             <a:r>
               <a:rPr lang="pt-PT" sz="1000" dirty="0" err="1"/>
-              <a:t>val_loss</a:t>
+              <a:t>val_</a:t>
+            </a:r>
+            <a:r>
+              <a:rPr lang="pt-PT" sz="1000" i="1" dirty="0" err="1"/>
+              <a:t>loss</a:t>
             </a:r>
             <a:r>
               <a:rPr lang="pt-PT" sz="1000" dirty="0"/>
-              <a:t> para o modelo </a:t>
-            </a:r>
-            <a:r>
-              <a:rPr lang="pt-PT" sz="1000" dirty="0" err="1"/>
+              <a:t>  - </a:t>
+            </a:r>
+            <a:r>
+              <a:rPr lang="pt-PT" sz="1000" i="1" dirty="0" err="1"/>
               <a:t>Convolutional</a:t>
             </a:r>
             <a:r>
               <a:rPr lang="pt-PT" sz="1000" dirty="0"/>
-              <a:t> LSTM </a:t>
+              <a:t> LSTM.</a:t>
             </a:r>
           </a:p>
         </p:txBody>
@@ -20235,7 +20575,7 @@
         </p:nvSpPr>
         <p:spPr>
           <a:xfrm>
-            <a:off x="1520662" y="4902936"/>
+            <a:off x="1520662" y="4951061"/>
             <a:ext cx="4114799" cy="246221"/>
           </a:xfrm>
           <a:prstGeom prst="rect">
@@ -20271,7 +20611,7 @@
         </p:nvSpPr>
         <p:spPr>
           <a:xfrm>
-            <a:off x="6651414" y="4902935"/>
+            <a:off x="6651414" y="4951060"/>
             <a:ext cx="3744770" cy="246221"/>
           </a:xfrm>
           <a:prstGeom prst="rect">
@@ -20920,7 +21260,7 @@
         </p:nvSpPr>
         <p:spPr>
           <a:xfrm>
-            <a:off x="1520662" y="4902936"/>
+            <a:off x="1520662" y="4951061"/>
             <a:ext cx="4254496" cy="246221"/>
           </a:xfrm>
           <a:prstGeom prst="rect">
@@ -20956,7 +21296,7 @@
         </p:nvSpPr>
         <p:spPr>
           <a:xfrm>
-            <a:off x="6659302" y="4902935"/>
+            <a:off x="6659302" y="4951060"/>
             <a:ext cx="3736881" cy="246221"/>
           </a:xfrm>
           <a:prstGeom prst="rect">
@@ -22560,7 +22900,7 @@
         </p:nvSpPr>
         <p:spPr>
           <a:xfrm>
-            <a:off x="1520663" y="4902936"/>
+            <a:off x="1520663" y="4951061"/>
             <a:ext cx="4012038" cy="246221"/>
           </a:xfrm>
           <a:prstGeom prst="rect">
@@ -22604,7 +22944,7 @@
         </p:nvSpPr>
         <p:spPr>
           <a:xfrm>
-            <a:off x="6659300" y="4902935"/>
+            <a:off x="6659300" y="4951060"/>
             <a:ext cx="3736881" cy="246221"/>
           </a:xfrm>
           <a:prstGeom prst="rect">
@@ -26546,7 +26886,7 @@
         </p:nvSpPr>
         <p:spPr>
           <a:xfrm>
-            <a:off x="3606826" y="5838654"/>
+            <a:off x="3606826" y="5867529"/>
             <a:ext cx="4978348" cy="246221"/>
           </a:xfrm>
           <a:prstGeom prst="rect">
@@ -26889,7 +27229,7 @@
         </p:nvSpPr>
         <p:spPr>
           <a:xfrm>
-            <a:off x="3606826" y="5838654"/>
+            <a:off x="3606826" y="5867529"/>
             <a:ext cx="4978348" cy="246221"/>
           </a:xfrm>
           <a:prstGeom prst="rect">
@@ -29340,8 +29680,8 @@
         </p:nvSpPr>
         <p:spPr>
           <a:xfrm>
-            <a:off x="2402026" y="3283521"/>
-            <a:ext cx="2960599" cy="246221"/>
+            <a:off x="2256064" y="5906115"/>
+            <a:ext cx="3217884" cy="246221"/>
           </a:xfrm>
           <a:prstGeom prst="rect">
             <a:avLst/>
@@ -29376,8 +29716,8 @@
         </p:nvSpPr>
         <p:spPr>
           <a:xfrm>
-            <a:off x="6980446" y="3283520"/>
-            <a:ext cx="2939065" cy="246221"/>
+            <a:off x="6829372" y="5906114"/>
+            <a:ext cx="3217884" cy="246221"/>
           </a:xfrm>
           <a:prstGeom prst="rect">
             <a:avLst/>
@@ -29412,8 +29752,8 @@
         </p:nvSpPr>
         <p:spPr>
           <a:xfrm>
-            <a:off x="2267727" y="5884320"/>
-            <a:ext cx="3241210" cy="246221"/>
+            <a:off x="2402026" y="3311759"/>
+            <a:ext cx="2960600" cy="246221"/>
           </a:xfrm>
           <a:prstGeom prst="rect">
             <a:avLst/>
@@ -29448,8 +29788,8 @@
         </p:nvSpPr>
         <p:spPr>
           <a:xfrm>
-            <a:off x="6844326" y="5865069"/>
-            <a:ext cx="3217884" cy="246221"/>
+            <a:off x="6967888" y="3302106"/>
+            <a:ext cx="2940856" cy="246221"/>
           </a:xfrm>
           <a:prstGeom prst="rect">
             <a:avLst/>
@@ -34637,7 +34977,7 @@
             </a:r>
             <a:r>
               <a:rPr lang="pt-PT" sz="1000" dirty="0"/>
-              <a:t>, Fonte: Wikipédia</a:t>
+              <a:t>. Fonte: Wikipédia</a:t>
             </a:r>
           </a:p>
         </p:txBody>
@@ -34793,46 +35133,6 @@
           </a:p>
         </p:txBody>
       </p:sp>
-      <p:pic>
-        <p:nvPicPr>
-          <p:cNvPr id="6" name="Picture 5" descr="A diagram of a cell phone&#10;&#10;Description automatically generated">
-            <a:extLst>
-              <a:ext uri="{FF2B5EF4-FFF2-40B4-BE49-F238E27FC236}">
-                <a16:creationId xmlns:a16="http://schemas.microsoft.com/office/drawing/2014/main" id="{3561A150-CA01-A4B3-92B3-81DEAA07786E}"/>
-              </a:ext>
-            </a:extLst>
-          </p:cNvPr>
-          <p:cNvPicPr>
-            <a:picLocks noChangeAspect="1"/>
-          </p:cNvPicPr>
-          <p:nvPr/>
-        </p:nvPicPr>
-        <p:blipFill>
-          <a:blip r:embed="rId3" cstate="print">
-            <a:extLst>
-              <a:ext uri="{28A0092B-C50C-407E-A947-70E740481C1C}">
-                <a14:useLocalDpi xmlns:a14="http://schemas.microsoft.com/office/drawing/2010/main" val="0"/>
-              </a:ext>
-            </a:extLst>
-          </a:blip>
-          <a:stretch>
-            <a:fillRect/>
-          </a:stretch>
-        </p:blipFill>
-        <p:spPr bwMode="auto">
-          <a:xfrm>
-            <a:off x="3810164" y="751460"/>
-            <a:ext cx="6524625" cy="5355080"/>
-          </a:xfrm>
-          <a:prstGeom prst="rect">
-            <a:avLst/>
-          </a:prstGeom>
-          <a:noFill/>
-          <a:ln>
-            <a:noFill/>
-          </a:ln>
-        </p:spPr>
-      </p:pic>
       <p:sp>
         <p:nvSpPr>
           <p:cNvPr id="3" name="Title 1">
@@ -35030,7 +35330,7 @@
           <p:nvPr/>
         </p:nvPicPr>
         <p:blipFill>
-          <a:blip r:embed="rId4">
+          <a:blip r:embed="rId3">
             <a:alphaModFix amt="70000"/>
             <a:extLst>
               <a:ext uri="{28A0092B-C50C-407E-A947-70E740481C1C}">
@@ -35066,7 +35366,7 @@
         </p:nvSpPr>
         <p:spPr>
           <a:xfrm>
-            <a:off x="5015076" y="5862325"/>
+            <a:off x="4038599" y="5820490"/>
             <a:ext cx="4114799" cy="246221"/>
           </a:xfrm>
           <a:prstGeom prst="rect">
@@ -35088,6 +35388,36 @@
           </a:p>
         </p:txBody>
       </p:sp>
+      <p:pic>
+        <p:nvPicPr>
+          <p:cNvPr id="7" name="Picture 6">
+            <a:extLst>
+              <a:ext uri="{FF2B5EF4-FFF2-40B4-BE49-F238E27FC236}">
+                <a16:creationId xmlns:a16="http://schemas.microsoft.com/office/drawing/2014/main" id="{5D3C4DA9-5803-8C8C-916A-276B84E9DE91}"/>
+              </a:ext>
+            </a:extLst>
+          </p:cNvPr>
+          <p:cNvPicPr>
+            <a:picLocks noChangeAspect="1"/>
+          </p:cNvPicPr>
+          <p:nvPr/>
+        </p:nvPicPr>
+        <p:blipFill>
+          <a:blip r:embed="rId4"/>
+          <a:stretch>
+            <a:fillRect/>
+          </a:stretch>
+        </p:blipFill>
+        <p:spPr>
+          <a:xfrm>
+            <a:off x="3371848" y="1219915"/>
+            <a:ext cx="5448300" cy="4600575"/>
+          </a:xfrm>
+          <a:prstGeom prst="rect">
+            <a:avLst/>
+          </a:prstGeom>
+        </p:spPr>
+      </p:pic>
     </p:spTree>
     <p:extLst>
       <p:ext uri="{BB962C8B-B14F-4D97-AF65-F5344CB8AC3E}">
@@ -35110,6 +35440,9 @@
                     <p:cTn id="3" fill="hold">
                       <p:stCondLst>
                         <p:cond delay="indefinite"/>
+                        <p:cond evt="onBegin" delay="0">
+                          <p:tn val="2"/>
+                        </p:cond>
                       </p:stCondLst>
                       <p:childTnLst>
                         <p:par>
@@ -35119,7 +35452,7 @@
                             </p:stCondLst>
                             <p:childTnLst>
                               <p:par>
-                                <p:cTn id="5" presetID="1" presetClass="entr" presetSubtype="0" fill="hold" nodeType="clickEffect">
+                                <p:cTn id="5" presetID="1" presetClass="entr" presetSubtype="0" fill="hold" grpId="0" nodeType="withEffect">
                                   <p:stCondLst>
                                     <p:cond delay="0"/>
                                   </p:stCondLst>
@@ -35127,33 +35460,6 @@
                                     <p:set>
                                       <p:cBhvr>
                                         <p:cTn id="6" dur="1" fill="hold">
-                                          <p:stCondLst>
-                                            <p:cond delay="0"/>
-                                          </p:stCondLst>
-                                        </p:cTn>
-                                        <p:tgtEl>
-                                          <p:spTgt spid="6"/>
-                                        </p:tgtEl>
-                                        <p:attrNameLst>
-                                          <p:attrName>style.visibility</p:attrName>
-                                        </p:attrNameLst>
-                                      </p:cBhvr>
-                                      <p:to>
-                                        <p:strVal val="visible"/>
-                                      </p:to>
-                                    </p:set>
-                                  </p:childTnLst>
-                                </p:cTn>
-                              </p:par>
-                              <p:par>
-                                <p:cTn id="7" presetID="1" presetClass="entr" presetSubtype="0" fill="hold" grpId="0" nodeType="withEffect">
-                                  <p:stCondLst>
-                                    <p:cond delay="0"/>
-                                  </p:stCondLst>
-                                  <p:childTnLst>
-                                    <p:set>
-                                      <p:cBhvr>
-                                        <p:cTn id="8" dur="1" fill="hold">
                                           <p:stCondLst>
                                             <p:cond delay="0"/>
                                           </p:stCondLst>
@@ -37626,6 +37932,15 @@
 </file>
 
 <file path=customXml/item1.xml><?xml version="1.0" encoding="utf-8"?>
+<p:properties xmlns:p="http://schemas.microsoft.com/office/2006/metadata/properties" xmlns:xsi="http://www.w3.org/2001/XMLSchema-instance" xmlns:pc="http://schemas.microsoft.com/office/infopath/2007/PartnerControls">
+  <documentManagement>
+    <MediaServiceKeyPoints xmlns="49ea7286-31dc-4857-8ba0-9dd5131121ba" xsi:nil="true"/>
+    <_activity xmlns="49ea7286-31dc-4857-8ba0-9dd5131121ba" xsi:nil="true"/>
+  </documentManagement>
+</p:properties>
+</file>
+
+<file path=customXml/item2.xml><?xml version="1.0" encoding="utf-8"?>
 <ct:contentTypeSchema xmlns:ct="http://schemas.microsoft.com/office/2006/metadata/contentType" xmlns:ma="http://schemas.microsoft.com/office/2006/metadata/properties/metaAttributes" ct:_="" ma:_="" ma:contentTypeName="Document" ma:contentTypeID="0x010100A73A92E9BB0D154D881191BAEDDE609C" ma:contentTypeVersion="15" ma:contentTypeDescription="Create a new document." ma:contentTypeScope="" ma:versionID="efb1cbc0b36a0d4d469bd0290935f8df">
   <xsd:schema xmlns:xsd="http://www.w3.org/2001/XMLSchema" xmlns:xs="http://www.w3.org/2001/XMLSchema" xmlns:p="http://schemas.microsoft.com/office/2006/metadata/properties" xmlns:ns3="49ea7286-31dc-4857-8ba0-9dd5131121ba" xmlns:ns4="490ae867-905f-461a-953e-c60010c4e0c9" targetNamespace="http://schemas.microsoft.com/office/2006/metadata/properties" ma:root="true" ma:fieldsID="f3e6108c9adebc81ed2cd74cc74f8ca6" ns3:_="" ns4:_="">
     <xsd:import namespace="49ea7286-31dc-4857-8ba0-9dd5131121ba"/>
@@ -37860,15 +38175,6 @@
 </ct:contentTypeSchema>
 </file>
 
-<file path=customXml/item2.xml><?xml version="1.0" encoding="utf-8"?>
-<p:properties xmlns:p="http://schemas.microsoft.com/office/2006/metadata/properties" xmlns:xsi="http://www.w3.org/2001/XMLSchema-instance" xmlns:pc="http://schemas.microsoft.com/office/infopath/2007/PartnerControls">
-  <documentManagement>
-    <MediaServiceKeyPoints xmlns="49ea7286-31dc-4857-8ba0-9dd5131121ba" xsi:nil="true"/>
-    <_activity xmlns="49ea7286-31dc-4857-8ba0-9dd5131121ba" xsi:nil="true"/>
-  </documentManagement>
-</p:properties>
-</file>
-
 <file path=customXml/item3.xml><?xml version="1.0" encoding="utf-8"?>
 <?mso-contentType ?>
 <FormTemplates xmlns="http://schemas.microsoft.com/sharepoint/v3/contenttype/forms">
@@ -37879,6 +38185,23 @@
 </file>
 
 <file path=customXml/itemProps1.xml><?xml version="1.0" encoding="utf-8"?>
+<ds:datastoreItem xmlns:ds="http://schemas.openxmlformats.org/officeDocument/2006/customXml" ds:itemID="{CBDD27D0-5B6E-4A0E-95B2-BB37F9D88615}">
+  <ds:schemaRefs>
+    <ds:schemaRef ds:uri="http://purl.org/dc/dcmitype/"/>
+    <ds:schemaRef ds:uri="http://www.w3.org/XML/1998/namespace"/>
+    <ds:schemaRef ds:uri="http://schemas.openxmlformats.org/package/2006/metadata/core-properties"/>
+    <ds:schemaRef ds:uri="http://schemas.microsoft.com/office/2006/metadata/properties"/>
+    <ds:schemaRef ds:uri="http://purl.org/dc/elements/1.1/"/>
+    <ds:schemaRef ds:uri="http://schemas.microsoft.com/office/2006/documentManagement/types"/>
+    <ds:schemaRef ds:uri="http://purl.org/dc/terms/"/>
+    <ds:schemaRef ds:uri="http://schemas.microsoft.com/office/infopath/2007/PartnerControls"/>
+    <ds:schemaRef ds:uri="490ae867-905f-461a-953e-c60010c4e0c9"/>
+    <ds:schemaRef ds:uri="49ea7286-31dc-4857-8ba0-9dd5131121ba"/>
+  </ds:schemaRefs>
+</ds:datastoreItem>
+</file>
+
+<file path=customXml/itemProps2.xml><?xml version="1.0" encoding="utf-8"?>
 <ds:datastoreItem xmlns:ds="http://schemas.openxmlformats.org/officeDocument/2006/customXml" ds:itemID="{2772B1AE-A3BA-4700-8DCD-4A25B8D329B2}">
   <ds:schemaRefs>
     <ds:schemaRef ds:uri="http://schemas.microsoft.com/office/2006/metadata/contentType"/>
@@ -37897,23 +38220,6 @@
 </ds:datastoreItem>
 </file>
 
-<file path=customXml/itemProps2.xml><?xml version="1.0" encoding="utf-8"?>
-<ds:datastoreItem xmlns:ds="http://schemas.openxmlformats.org/officeDocument/2006/customXml" ds:itemID="{CBDD27D0-5B6E-4A0E-95B2-BB37F9D88615}">
-  <ds:schemaRefs>
-    <ds:schemaRef ds:uri="http://purl.org/dc/dcmitype/"/>
-    <ds:schemaRef ds:uri="http://www.w3.org/XML/1998/namespace"/>
-    <ds:schemaRef ds:uri="http://schemas.openxmlformats.org/package/2006/metadata/core-properties"/>
-    <ds:schemaRef ds:uri="http://schemas.microsoft.com/office/2006/metadata/properties"/>
-    <ds:schemaRef ds:uri="http://purl.org/dc/elements/1.1/"/>
-    <ds:schemaRef ds:uri="http://schemas.microsoft.com/office/2006/documentManagement/types"/>
-    <ds:schemaRef ds:uri="http://purl.org/dc/terms/"/>
-    <ds:schemaRef ds:uri="http://schemas.microsoft.com/office/infopath/2007/PartnerControls"/>
-    <ds:schemaRef ds:uri="490ae867-905f-461a-953e-c60010c4e0c9"/>
-    <ds:schemaRef ds:uri="49ea7286-31dc-4857-8ba0-9dd5131121ba"/>
-  </ds:schemaRefs>
-</ds:datastoreItem>
-</file>
-
 <file path=customXml/itemProps3.xml><?xml version="1.0" encoding="utf-8"?>
 <ds:datastoreItem xmlns:ds="http://schemas.openxmlformats.org/officeDocument/2006/customXml" ds:itemID="{A98CD342-50C4-441F-B4A3-7D5ADB057132}">
   <ds:schemaRefs>

</xml_diff>

<commit_message>
Update pptx - add notes(2A)
</commit_message>
<xml_diff>
--- a/ProjInf_AI_Driving_Classification.pptx
+++ b/ProjInf_AI_Driving_Classification.pptx
@@ -4388,7 +4388,130 @@
           <a:bodyPr/>
           <a:lstStyle/>
           <a:p>
-            <a:endParaRPr lang="pt-PT" dirty="0"/>
+            <a:r>
+              <a:rPr lang="en-US" b="0" i="0" dirty="0">
+                <a:solidFill>
+                  <a:srgbClr val="BFBFBF"/>
+                </a:solidFill>
+                <a:effectLst/>
+                <a:latin typeface="Arial" panose="020B0604020202020204" pitchFamily="34" charset="0"/>
+              </a:rPr>
+              <a:t>ROC - Receiver Operating characteristic Curve</a:t>
+            </a:r>
+          </a:p>
+          <a:p>
+            <a:r>
+              <a:rPr lang="en-US" b="0" i="0" dirty="0">
+                <a:solidFill>
+                  <a:srgbClr val="BFBFBF"/>
+                </a:solidFill>
+                <a:effectLst/>
+                <a:latin typeface="Arial" panose="020B0604020202020204" pitchFamily="34" charset="0"/>
+              </a:rPr>
+              <a:t>É</a:t>
+            </a:r>
+            <a:r>
+              <a:rPr lang="pt-PT" dirty="0"/>
+              <a:t> um gráfico que ilustra o desempenho de um modelo de classificação binária em diferentes </a:t>
+            </a:r>
+            <a:r>
+              <a:rPr lang="en-US" b="0" i="0" dirty="0">
+                <a:solidFill>
+                  <a:srgbClr val="BFBFBF"/>
+                </a:solidFill>
+                <a:effectLst/>
+                <a:latin typeface="Arial" panose="020B0604020202020204" pitchFamily="34" charset="0"/>
+              </a:rPr>
+              <a:t>thresholds.</a:t>
+            </a:r>
+          </a:p>
+          <a:p>
+            <a:endParaRPr lang="en-US" b="0" i="0" dirty="0">
+              <a:solidFill>
+                <a:srgbClr val="BFBFBF"/>
+              </a:solidFill>
+              <a:effectLst/>
+              <a:latin typeface="Arial" panose="020B0604020202020204" pitchFamily="34" charset="0"/>
+            </a:endParaRPr>
+          </a:p>
+          <a:p>
+            <a:br>
+              <a:rPr lang="en-US" b="0" i="0" dirty="0">
+                <a:solidFill>
+                  <a:srgbClr val="BFBFBF"/>
+                </a:solidFill>
+                <a:effectLst/>
+                <a:latin typeface="Arial" panose="020B0604020202020204" pitchFamily="34" charset="0"/>
+              </a:rPr>
+            </a:br>
+            <a:r>
+              <a:rPr lang="en-US" b="0" i="0" dirty="0">
+                <a:solidFill>
+                  <a:srgbClr val="BFBFBF"/>
+                </a:solidFill>
+                <a:effectLst/>
+                <a:latin typeface="Arial" panose="020B0604020202020204" pitchFamily="34" charset="0"/>
+              </a:rPr>
+              <a:t>AUC – Area sob a curva</a:t>
+            </a:r>
+          </a:p>
+          <a:p>
+            <a:r>
+              <a:rPr lang="pt-PT" b="0" i="0" dirty="0">
+                <a:solidFill>
+                  <a:srgbClr val="BFBFBF"/>
+                </a:solidFill>
+                <a:effectLst/>
+                <a:latin typeface="Arial" panose="020B0604020202020204" pitchFamily="34" charset="0"/>
+              </a:rPr>
+              <a:t>É</a:t>
+            </a:r>
+            <a:r>
+              <a:rPr lang="pt-PT" dirty="0"/>
+              <a:t> uma métrica que quantifica a capacidade do modelo em distinguir entre classes positivas e negativas</a:t>
+            </a:r>
+            <a:br>
+              <a:rPr lang="en-US" b="0" i="0" dirty="0">
+                <a:solidFill>
+                  <a:srgbClr val="BFBFBF"/>
+                </a:solidFill>
+                <a:effectLst/>
+                <a:latin typeface="Arial" panose="020B0604020202020204" pitchFamily="34" charset="0"/>
+              </a:rPr>
+            </a:br>
+            <a:br>
+              <a:rPr lang="en-US" b="0" i="0" dirty="0">
+                <a:solidFill>
+                  <a:srgbClr val="BFBFBF"/>
+                </a:solidFill>
+                <a:effectLst/>
+                <a:latin typeface="Arial" panose="020B0604020202020204" pitchFamily="34" charset="0"/>
+              </a:rPr>
+            </a:br>
+            <a:r>
+              <a:rPr lang="pt-PT" dirty="0"/>
+              <a:t>AUC varia 0 e 1</a:t>
+            </a:r>
+            <a:br>
+              <a:rPr lang="pt-PT" dirty="0"/>
+            </a:br>
+            <a:r>
+              <a:rPr lang="pt-PT" dirty="0"/>
+              <a:t>AUC de 0,5 	- modelo que não tem capacidade de discriminação (equivalente a uma classificação aleatória) </a:t>
+            </a:r>
+            <a:br>
+              <a:rPr lang="pt-PT" dirty="0"/>
+            </a:br>
+            <a:r>
+              <a:rPr lang="pt-PT" dirty="0"/>
+              <a:t>AUC de 1 	- indica uma classificação perfeita. </a:t>
+            </a:r>
+          </a:p>
+          <a:p>
+            <a:r>
+              <a:rPr lang="pt-PT" dirty="0"/>
+              <a:t>Quanto maior o AUC, melhor o desempenho do modelo.</a:t>
+            </a:r>
           </a:p>
         </p:txBody>
       </p:sp>
@@ -4472,7 +4595,130 @@
           <a:bodyPr/>
           <a:lstStyle/>
           <a:p>
-            <a:endParaRPr lang="pt-PT" dirty="0"/>
+            <a:r>
+              <a:rPr lang="en-US" b="0" i="0" dirty="0">
+                <a:solidFill>
+                  <a:srgbClr val="BFBFBF"/>
+                </a:solidFill>
+                <a:effectLst/>
+                <a:latin typeface="Arial" panose="020B0604020202020204" pitchFamily="34" charset="0"/>
+              </a:rPr>
+              <a:t>ROC - Receiver Operating characteristic Curve</a:t>
+            </a:r>
+          </a:p>
+          <a:p>
+            <a:r>
+              <a:rPr lang="en-US" b="0" i="0" dirty="0">
+                <a:solidFill>
+                  <a:srgbClr val="BFBFBF"/>
+                </a:solidFill>
+                <a:effectLst/>
+                <a:latin typeface="Arial" panose="020B0604020202020204" pitchFamily="34" charset="0"/>
+              </a:rPr>
+              <a:t>É</a:t>
+            </a:r>
+            <a:r>
+              <a:rPr lang="pt-PT" dirty="0"/>
+              <a:t> um gráfico que ilustra o desempenho de um modelo de classificação binária em diferentes </a:t>
+            </a:r>
+            <a:r>
+              <a:rPr lang="en-US" b="0" i="0" dirty="0">
+                <a:solidFill>
+                  <a:srgbClr val="BFBFBF"/>
+                </a:solidFill>
+                <a:effectLst/>
+                <a:latin typeface="Arial" panose="020B0604020202020204" pitchFamily="34" charset="0"/>
+              </a:rPr>
+              <a:t>thresholds.</a:t>
+            </a:r>
+          </a:p>
+          <a:p>
+            <a:endParaRPr lang="en-US" b="0" i="0" dirty="0">
+              <a:solidFill>
+                <a:srgbClr val="BFBFBF"/>
+              </a:solidFill>
+              <a:effectLst/>
+              <a:latin typeface="Arial" panose="020B0604020202020204" pitchFamily="34" charset="0"/>
+            </a:endParaRPr>
+          </a:p>
+          <a:p>
+            <a:br>
+              <a:rPr lang="en-US" b="0" i="0" dirty="0">
+                <a:solidFill>
+                  <a:srgbClr val="BFBFBF"/>
+                </a:solidFill>
+                <a:effectLst/>
+                <a:latin typeface="Arial" panose="020B0604020202020204" pitchFamily="34" charset="0"/>
+              </a:rPr>
+            </a:br>
+            <a:r>
+              <a:rPr lang="en-US" b="0" i="0" dirty="0">
+                <a:solidFill>
+                  <a:srgbClr val="BFBFBF"/>
+                </a:solidFill>
+                <a:effectLst/>
+                <a:latin typeface="Arial" panose="020B0604020202020204" pitchFamily="34" charset="0"/>
+              </a:rPr>
+              <a:t>AUC – Area sob a curva</a:t>
+            </a:r>
+          </a:p>
+          <a:p>
+            <a:r>
+              <a:rPr lang="pt-PT" b="0" i="0" dirty="0">
+                <a:solidFill>
+                  <a:srgbClr val="BFBFBF"/>
+                </a:solidFill>
+                <a:effectLst/>
+                <a:latin typeface="Arial" panose="020B0604020202020204" pitchFamily="34" charset="0"/>
+              </a:rPr>
+              <a:t>É</a:t>
+            </a:r>
+            <a:r>
+              <a:rPr lang="pt-PT" dirty="0"/>
+              <a:t> uma métrica que quantifica a capacidade do modelo em distinguir entre classes positivas e negativas</a:t>
+            </a:r>
+            <a:br>
+              <a:rPr lang="en-US" b="0" i="0" dirty="0">
+                <a:solidFill>
+                  <a:srgbClr val="BFBFBF"/>
+                </a:solidFill>
+                <a:effectLst/>
+                <a:latin typeface="Arial" panose="020B0604020202020204" pitchFamily="34" charset="0"/>
+              </a:rPr>
+            </a:br>
+            <a:br>
+              <a:rPr lang="en-US" b="0" i="0" dirty="0">
+                <a:solidFill>
+                  <a:srgbClr val="BFBFBF"/>
+                </a:solidFill>
+                <a:effectLst/>
+                <a:latin typeface="Arial" panose="020B0604020202020204" pitchFamily="34" charset="0"/>
+              </a:rPr>
+            </a:br>
+            <a:r>
+              <a:rPr lang="pt-PT" dirty="0"/>
+              <a:t>AUC varia 0 e 1</a:t>
+            </a:r>
+            <a:br>
+              <a:rPr lang="pt-PT" dirty="0"/>
+            </a:br>
+            <a:r>
+              <a:rPr lang="pt-PT" dirty="0"/>
+              <a:t>AUC de 0,5 	- modelo que não tem capacidade de discriminação (equivalente a uma classificação aleatória) </a:t>
+            </a:r>
+            <a:br>
+              <a:rPr lang="pt-PT" dirty="0"/>
+            </a:br>
+            <a:r>
+              <a:rPr lang="pt-PT" dirty="0"/>
+              <a:t>AUC de 1 	- indica uma classificação perfeita. </a:t>
+            </a:r>
+          </a:p>
+          <a:p>
+            <a:r>
+              <a:rPr lang="pt-PT" dirty="0"/>
+              <a:t>Quanto maior o AUC, melhor o desempenho do modelo.</a:t>
+            </a:r>
           </a:p>
         </p:txBody>
       </p:sp>
@@ -4556,7 +4802,130 @@
           <a:bodyPr/>
           <a:lstStyle/>
           <a:p>
-            <a:endParaRPr lang="pt-PT" dirty="0"/>
+            <a:r>
+              <a:rPr lang="en-US" b="0" i="0" dirty="0">
+                <a:solidFill>
+                  <a:srgbClr val="BFBFBF"/>
+                </a:solidFill>
+                <a:effectLst/>
+                <a:latin typeface="Arial" panose="020B0604020202020204" pitchFamily="34" charset="0"/>
+              </a:rPr>
+              <a:t>ROC - Receiver Operating characteristic Curve</a:t>
+            </a:r>
+          </a:p>
+          <a:p>
+            <a:r>
+              <a:rPr lang="en-US" b="0" i="0" dirty="0">
+                <a:solidFill>
+                  <a:srgbClr val="BFBFBF"/>
+                </a:solidFill>
+                <a:effectLst/>
+                <a:latin typeface="Arial" panose="020B0604020202020204" pitchFamily="34" charset="0"/>
+              </a:rPr>
+              <a:t>É</a:t>
+            </a:r>
+            <a:r>
+              <a:rPr lang="pt-PT" dirty="0"/>
+              <a:t> um gráfico que ilustra o desempenho de um modelo de classificação binária em diferentes </a:t>
+            </a:r>
+            <a:r>
+              <a:rPr lang="en-US" b="0" i="0" dirty="0">
+                <a:solidFill>
+                  <a:srgbClr val="BFBFBF"/>
+                </a:solidFill>
+                <a:effectLst/>
+                <a:latin typeface="Arial" panose="020B0604020202020204" pitchFamily="34" charset="0"/>
+              </a:rPr>
+              <a:t>thresholds.</a:t>
+            </a:r>
+          </a:p>
+          <a:p>
+            <a:endParaRPr lang="en-US" b="0" i="0" dirty="0">
+              <a:solidFill>
+                <a:srgbClr val="BFBFBF"/>
+              </a:solidFill>
+              <a:effectLst/>
+              <a:latin typeface="Arial" panose="020B0604020202020204" pitchFamily="34" charset="0"/>
+            </a:endParaRPr>
+          </a:p>
+          <a:p>
+            <a:br>
+              <a:rPr lang="en-US" b="0" i="0" dirty="0">
+                <a:solidFill>
+                  <a:srgbClr val="BFBFBF"/>
+                </a:solidFill>
+                <a:effectLst/>
+                <a:latin typeface="Arial" panose="020B0604020202020204" pitchFamily="34" charset="0"/>
+              </a:rPr>
+            </a:br>
+            <a:r>
+              <a:rPr lang="en-US" b="0" i="0" dirty="0">
+                <a:solidFill>
+                  <a:srgbClr val="BFBFBF"/>
+                </a:solidFill>
+                <a:effectLst/>
+                <a:latin typeface="Arial" panose="020B0604020202020204" pitchFamily="34" charset="0"/>
+              </a:rPr>
+              <a:t>AUC – Area sob a curva</a:t>
+            </a:r>
+          </a:p>
+          <a:p>
+            <a:r>
+              <a:rPr lang="pt-PT" b="0" i="0" dirty="0">
+                <a:solidFill>
+                  <a:srgbClr val="BFBFBF"/>
+                </a:solidFill>
+                <a:effectLst/>
+                <a:latin typeface="Arial" panose="020B0604020202020204" pitchFamily="34" charset="0"/>
+              </a:rPr>
+              <a:t>É</a:t>
+            </a:r>
+            <a:r>
+              <a:rPr lang="pt-PT" dirty="0"/>
+              <a:t> uma métrica que quantifica a capacidade do modelo em distinguir entre classes positivas e negativas</a:t>
+            </a:r>
+            <a:br>
+              <a:rPr lang="en-US" b="0" i="0" dirty="0">
+                <a:solidFill>
+                  <a:srgbClr val="BFBFBF"/>
+                </a:solidFill>
+                <a:effectLst/>
+                <a:latin typeface="Arial" panose="020B0604020202020204" pitchFamily="34" charset="0"/>
+              </a:rPr>
+            </a:br>
+            <a:br>
+              <a:rPr lang="en-US" b="0" i="0" dirty="0">
+                <a:solidFill>
+                  <a:srgbClr val="BFBFBF"/>
+                </a:solidFill>
+                <a:effectLst/>
+                <a:latin typeface="Arial" panose="020B0604020202020204" pitchFamily="34" charset="0"/>
+              </a:rPr>
+            </a:br>
+            <a:r>
+              <a:rPr lang="pt-PT" dirty="0"/>
+              <a:t>AUC varia 0 e 1</a:t>
+            </a:r>
+            <a:br>
+              <a:rPr lang="pt-PT" dirty="0"/>
+            </a:br>
+            <a:r>
+              <a:rPr lang="pt-PT" dirty="0"/>
+              <a:t>AUC de 0,5 	- modelo que não tem capacidade de discriminação (equivalente a uma classificação aleatória) </a:t>
+            </a:r>
+            <a:br>
+              <a:rPr lang="pt-PT" dirty="0"/>
+            </a:br>
+            <a:r>
+              <a:rPr lang="pt-PT" dirty="0"/>
+              <a:t>AUC de 1 	- indica uma classificação perfeita. </a:t>
+            </a:r>
+          </a:p>
+          <a:p>
+            <a:r>
+              <a:rPr lang="pt-PT" dirty="0"/>
+              <a:t>Quanto maior o AUC, melhor o desempenho do modelo.</a:t>
+            </a:r>
           </a:p>
         </p:txBody>
       </p:sp>
@@ -4724,6 +5093,132 @@
           <a:bodyPr/>
           <a:lstStyle/>
           <a:p>
+            <a:r>
+              <a:rPr lang="en-US" b="0" i="0" dirty="0">
+                <a:solidFill>
+                  <a:srgbClr val="BFBFBF"/>
+                </a:solidFill>
+                <a:effectLst/>
+                <a:latin typeface="Arial" panose="020B0604020202020204" pitchFamily="34" charset="0"/>
+              </a:rPr>
+              <a:t>ROC - Receiver Operating characteristic Curve</a:t>
+            </a:r>
+          </a:p>
+          <a:p>
+            <a:r>
+              <a:rPr lang="en-US" b="0" i="0" dirty="0">
+                <a:solidFill>
+                  <a:srgbClr val="BFBFBF"/>
+                </a:solidFill>
+                <a:effectLst/>
+                <a:latin typeface="Arial" panose="020B0604020202020204" pitchFamily="34" charset="0"/>
+              </a:rPr>
+              <a:t>É</a:t>
+            </a:r>
+            <a:r>
+              <a:rPr lang="pt-PT" dirty="0"/>
+              <a:t> um gráfico que ilustra o desempenho de um modelo de classificação binária em diferentes </a:t>
+            </a:r>
+            <a:r>
+              <a:rPr lang="en-US" b="0" i="0" dirty="0">
+                <a:solidFill>
+                  <a:srgbClr val="BFBFBF"/>
+                </a:solidFill>
+                <a:effectLst/>
+                <a:latin typeface="Arial" panose="020B0604020202020204" pitchFamily="34" charset="0"/>
+              </a:rPr>
+              <a:t>thresholds.</a:t>
+            </a:r>
+          </a:p>
+          <a:p>
+            <a:endParaRPr lang="en-US" b="0" i="0" dirty="0">
+              <a:solidFill>
+                <a:srgbClr val="BFBFBF"/>
+              </a:solidFill>
+              <a:effectLst/>
+              <a:latin typeface="Arial" panose="020B0604020202020204" pitchFamily="34" charset="0"/>
+            </a:endParaRPr>
+          </a:p>
+          <a:p>
+            <a:br>
+              <a:rPr lang="en-US" b="0" i="0" dirty="0">
+                <a:solidFill>
+                  <a:srgbClr val="BFBFBF"/>
+                </a:solidFill>
+                <a:effectLst/>
+                <a:latin typeface="Arial" panose="020B0604020202020204" pitchFamily="34" charset="0"/>
+              </a:rPr>
+            </a:br>
+            <a:r>
+              <a:rPr lang="en-US" b="0" i="0" dirty="0">
+                <a:solidFill>
+                  <a:srgbClr val="BFBFBF"/>
+                </a:solidFill>
+                <a:effectLst/>
+                <a:latin typeface="Arial" panose="020B0604020202020204" pitchFamily="34" charset="0"/>
+              </a:rPr>
+              <a:t>AUC – Area sob a curva</a:t>
+            </a:r>
+          </a:p>
+          <a:p>
+            <a:r>
+              <a:rPr lang="pt-PT" b="0" i="0" dirty="0">
+                <a:solidFill>
+                  <a:srgbClr val="BFBFBF"/>
+                </a:solidFill>
+                <a:effectLst/>
+                <a:latin typeface="Arial" panose="020B0604020202020204" pitchFamily="34" charset="0"/>
+              </a:rPr>
+              <a:t>É</a:t>
+            </a:r>
+            <a:r>
+              <a:rPr lang="pt-PT" dirty="0"/>
+              <a:t> uma métrica que quantifica a capacidade do modelo em distinguir entre classes positivas e negativas</a:t>
+            </a:r>
+            <a:br>
+              <a:rPr lang="en-US" b="0" i="0" dirty="0">
+                <a:solidFill>
+                  <a:srgbClr val="BFBFBF"/>
+                </a:solidFill>
+                <a:effectLst/>
+                <a:latin typeface="Arial" panose="020B0604020202020204" pitchFamily="34" charset="0"/>
+              </a:rPr>
+            </a:br>
+            <a:br>
+              <a:rPr lang="en-US" b="0" i="0" dirty="0">
+                <a:solidFill>
+                  <a:srgbClr val="BFBFBF"/>
+                </a:solidFill>
+                <a:effectLst/>
+                <a:latin typeface="Arial" panose="020B0604020202020204" pitchFamily="34" charset="0"/>
+              </a:rPr>
+            </a:br>
+            <a:r>
+              <a:rPr lang="pt-PT" dirty="0"/>
+              <a:t>AUC varia 0 e 1</a:t>
+            </a:r>
+            <a:br>
+              <a:rPr lang="pt-PT" dirty="0"/>
+            </a:br>
+            <a:r>
+              <a:rPr lang="pt-PT" dirty="0"/>
+              <a:t>AUC de 0,5 	- modelo que não tem capacidade de discriminação (equivalente a uma classificação aleatória) </a:t>
+            </a:r>
+            <a:br>
+              <a:rPr lang="pt-PT" dirty="0"/>
+            </a:br>
+            <a:r>
+              <a:rPr lang="pt-PT" dirty="0"/>
+              <a:t>AUC de 1 	- indica uma classificação perfeita. </a:t>
+            </a:r>
+          </a:p>
+          <a:p>
+            <a:r>
+              <a:rPr lang="pt-PT" dirty="0"/>
+              <a:t>Quanto maior o AUC, melhor o desempenho do modelo.</a:t>
+            </a:r>
+          </a:p>
+          <a:p>
             <a:endParaRPr lang="pt-PT" dirty="0"/>
           </a:p>
         </p:txBody>
@@ -4808,7 +5303,10 @@
           <a:bodyPr/>
           <a:lstStyle/>
           <a:p>
-            <a:endParaRPr lang="pt-PT" dirty="0"/>
+            <a:r>
+              <a:rPr lang="pt-PT" dirty="0"/>
+              <a:t>Na segunda abordagem usamos pequenos cenários de condução gravados e preclassificados</a:t>
+            </a:r>
           </a:p>
         </p:txBody>
       </p:sp>
@@ -4892,7 +5390,37 @@
           <a:bodyPr/>
           <a:lstStyle/>
           <a:p>
+            <a:r>
+              <a:rPr lang="pt-PT" dirty="0"/>
+              <a:t>Esses cenários são: </a:t>
+            </a:r>
+          </a:p>
+          <a:p>
+            <a:r>
+              <a:rPr lang="pt-PT" dirty="0"/>
+              <a:t>Cenários de Aceleração em linha reta</a:t>
+            </a:r>
+          </a:p>
+          <a:p>
+            <a:r>
+              <a:rPr lang="pt-PT" dirty="0"/>
+              <a:t>Travagem usando o pedal de travão </a:t>
+            </a:r>
+          </a:p>
+          <a:p>
+            <a:r>
+              <a:rPr lang="pt-PT" dirty="0"/>
+              <a:t>e Interseções.</a:t>
+            </a:r>
+          </a:p>
+          <a:p>
             <a:endParaRPr lang="pt-PT" dirty="0"/>
+          </a:p>
+          <a:p>
+            <a:r>
+              <a:rPr lang="pt-PT" dirty="0"/>
+              <a:t>Os cenários foram preclassificados como Lento, Normal e Agressivo.</a:t>
+            </a:r>
           </a:p>
         </p:txBody>
       </p:sp>
@@ -4981,6 +5509,51 @@
               <a:t>Vou descrever o fluxo de dados desde a captura até ao treino e teste do modelo.</a:t>
             </a:r>
           </a:p>
+          <a:p>
+            <a:endParaRPr lang="pt-PT" dirty="0"/>
+          </a:p>
+          <a:p>
+            <a:r>
+              <a:rPr lang="pt-PT" dirty="0"/>
+              <a:t>Depois da recolha dos diferentes cenários de condução seguimos para a importação e limpeza dos dados.</a:t>
+            </a:r>
+          </a:p>
+          <a:p>
+            <a:endParaRPr lang="pt-PT" dirty="0"/>
+          </a:p>
+          <a:p>
+            <a:r>
+              <a:rPr lang="pt-PT" dirty="0"/>
+              <a:t>Em seguida aplicamos uma </a:t>
+            </a:r>
+            <a:r>
+              <a:rPr lang="pt-PT" dirty="0" err="1"/>
+              <a:t>Rolling</a:t>
+            </a:r>
+            <a:r>
+              <a:rPr lang="pt-PT" dirty="0"/>
+              <a:t> </a:t>
+            </a:r>
+            <a:r>
+              <a:rPr lang="pt-PT" dirty="0" err="1"/>
+              <a:t>Window</a:t>
+            </a:r>
+            <a:r>
+              <a:rPr lang="pt-PT" dirty="0"/>
+              <a:t> centrada de tamanho 3, que calcula a média do próprio valor, o anterior e o seguinte para obter um novo valor. Com isto conseguimos reduzir </a:t>
+            </a:r>
+            <a:r>
+              <a:rPr lang="pt-PT" dirty="0" err="1"/>
+              <a:t>ruidos</a:t>
+            </a:r>
+            <a:r>
+              <a:rPr lang="pt-PT" dirty="0"/>
+              <a:t> e erros nos dados capturados.</a:t>
+            </a:r>
+          </a:p>
+          <a:p>
+            <a:endParaRPr lang="pt-PT" dirty="0"/>
+          </a:p>
         </p:txBody>
       </p:sp>
       <p:sp>
@@ -5063,7 +5636,31 @@
           <a:bodyPr/>
           <a:lstStyle/>
           <a:p>
+            <a:r>
+              <a:rPr lang="pt-PT" dirty="0"/>
+              <a:t>Procedemos à normalização dos dados e à segmentação dos dados brutos em janelas temporais de tamanho 16 e com 1 linha de deslocamento</a:t>
+            </a:r>
+          </a:p>
+          <a:p>
             <a:endParaRPr lang="pt-PT" dirty="0"/>
+          </a:p>
+          <a:p>
+            <a:r>
+              <a:rPr lang="pt-PT" dirty="0"/>
+              <a:t>De seguida dividimos os dados em conjuntos de treino, validação e teste. </a:t>
+            </a:r>
+          </a:p>
+          <a:p>
+            <a:r>
+              <a:rPr lang="pt-PT" dirty="0"/>
+              <a:t>O conjunto de treino e validação são usados para o treino do modelo</a:t>
+            </a:r>
+          </a:p>
+          <a:p>
+            <a:r>
+              <a:rPr lang="pt-PT" dirty="0"/>
+              <a:t>E o conjunto de teste é usado na avaliação do modelo</a:t>
+            </a:r>
           </a:p>
         </p:txBody>
       </p:sp>
@@ -5231,7 +5828,33 @@
           <a:bodyPr/>
           <a:lstStyle/>
           <a:p>
+            <a:r>
+              <a:rPr lang="pt-PT" dirty="0"/>
+              <a:t>Nesta tabela apresentamos os resultados gerais dos modelos desenvolvidos.</a:t>
+            </a:r>
+          </a:p>
+          <a:p>
             <a:endParaRPr lang="pt-PT" dirty="0"/>
+          </a:p>
+          <a:p>
+            <a:r>
+              <a:rPr lang="pt-PT" dirty="0"/>
+              <a:t>Os modelos têm resultados muito parecidos, o Bidirecional com uma accuracy e </a:t>
+            </a:r>
+            <a:r>
+              <a:rPr lang="pt-PT" dirty="0" err="1"/>
+              <a:t>loss</a:t>
+            </a:r>
+            <a:r>
+              <a:rPr lang="pt-PT" dirty="0"/>
+              <a:t>, ligeiramente, superior ao Stacked LSTM</a:t>
+            </a:r>
+          </a:p>
+          <a:p>
+            <a:r>
+              <a:rPr lang="pt-PT" dirty="0"/>
+              <a:t>E o Stacked LSTM sendo, ligeiramente, melhor no resto das métricas</a:t>
+            </a:r>
           </a:p>
         </p:txBody>
       </p:sp>
@@ -5315,7 +5938,48 @@
           <a:bodyPr/>
           <a:lstStyle/>
           <a:p>
+            <a:r>
+              <a:rPr lang="pt-PT" dirty="0"/>
+              <a:t>Nos resultados Por Classe conseguimos analisar qual ou quais as classes que modelo tem mais dificuldade em classificar</a:t>
+            </a:r>
+          </a:p>
+          <a:p>
             <a:endParaRPr lang="pt-PT" dirty="0"/>
+          </a:p>
+          <a:p>
+            <a:r>
+              <a:rPr lang="pt-PT" dirty="0"/>
+              <a:t>Na matriz de confusão do Stacked LSTM vemos que as linhas da classe “slow” têm a maior quantidade de falsos positivos e falsos negativos</a:t>
+            </a:r>
+          </a:p>
+          <a:p>
+            <a:r>
+              <a:rPr lang="pt-PT" dirty="0"/>
+              <a:t>No erro por classe conseguimos observar um comportamento semelhante, onde a classe “slow” tem um erro por classe significativamente superior.</a:t>
+            </a:r>
+          </a:p>
+          <a:p>
+            <a:endParaRPr lang="pt-PT" dirty="0"/>
+          </a:p>
+          <a:p>
+            <a:r>
+              <a:rPr lang="pt-PT" dirty="0"/>
+              <a:t>Já na </a:t>
+            </a:r>
+            <a:r>
+              <a:rPr lang="pt-PT" dirty="0" err="1"/>
+              <a:t>matrix</a:t>
+            </a:r>
+            <a:r>
+              <a:rPr lang="pt-PT" dirty="0"/>
+              <a:t> de confusão da Bidirectional LSTM conseguimos observar uma distribuição bastante mais uniforme com menos classificações erradas.</a:t>
+            </a:r>
+          </a:p>
+          <a:p>
+            <a:r>
+              <a:rPr lang="pt-PT" dirty="0"/>
+              <a:t>No entanto, quando observamos o erro por classe vemos que o modelo tem uma ligeira dificuldade na classe “normal”</a:t>
+            </a:r>
           </a:p>
         </p:txBody>
       </p:sp>
@@ -24387,7 +25051,7 @@
             </a:r>
             <a:r>
               <a:rPr lang="pt-PT" dirty="0"/>
-              <a:t> de cenários pré-gravados</a:t>
+              <a:t> de cenários gravados</a:t>
             </a:r>
           </a:p>
         </p:txBody>
@@ -37932,15 +38596,6 @@
 </file>
 
 <file path=customXml/item1.xml><?xml version="1.0" encoding="utf-8"?>
-<p:properties xmlns:p="http://schemas.microsoft.com/office/2006/metadata/properties" xmlns:xsi="http://www.w3.org/2001/XMLSchema-instance" xmlns:pc="http://schemas.microsoft.com/office/infopath/2007/PartnerControls">
-  <documentManagement>
-    <MediaServiceKeyPoints xmlns="49ea7286-31dc-4857-8ba0-9dd5131121ba" xsi:nil="true"/>
-    <_activity xmlns="49ea7286-31dc-4857-8ba0-9dd5131121ba" xsi:nil="true"/>
-  </documentManagement>
-</p:properties>
-</file>
-
-<file path=customXml/item2.xml><?xml version="1.0" encoding="utf-8"?>
 <ct:contentTypeSchema xmlns:ct="http://schemas.microsoft.com/office/2006/metadata/contentType" xmlns:ma="http://schemas.microsoft.com/office/2006/metadata/properties/metaAttributes" ct:_="" ma:_="" ma:contentTypeName="Document" ma:contentTypeID="0x010100A73A92E9BB0D154D881191BAEDDE609C" ma:contentTypeVersion="15" ma:contentTypeDescription="Create a new document." ma:contentTypeScope="" ma:versionID="efb1cbc0b36a0d4d469bd0290935f8df">
   <xsd:schema xmlns:xsd="http://www.w3.org/2001/XMLSchema" xmlns:xs="http://www.w3.org/2001/XMLSchema" xmlns:p="http://schemas.microsoft.com/office/2006/metadata/properties" xmlns:ns3="49ea7286-31dc-4857-8ba0-9dd5131121ba" xmlns:ns4="490ae867-905f-461a-953e-c60010c4e0c9" targetNamespace="http://schemas.microsoft.com/office/2006/metadata/properties" ma:root="true" ma:fieldsID="f3e6108c9adebc81ed2cd74cc74f8ca6" ns3:_="" ns4:_="">
     <xsd:import namespace="49ea7286-31dc-4857-8ba0-9dd5131121ba"/>
@@ -38175,6 +38830,15 @@
 </ct:contentTypeSchema>
 </file>
 
+<file path=customXml/item2.xml><?xml version="1.0" encoding="utf-8"?>
+<p:properties xmlns:p="http://schemas.microsoft.com/office/2006/metadata/properties" xmlns:xsi="http://www.w3.org/2001/XMLSchema-instance" xmlns:pc="http://schemas.microsoft.com/office/infopath/2007/PartnerControls">
+  <documentManagement>
+    <MediaServiceKeyPoints xmlns="49ea7286-31dc-4857-8ba0-9dd5131121ba" xsi:nil="true"/>
+    <_activity xmlns="49ea7286-31dc-4857-8ba0-9dd5131121ba" xsi:nil="true"/>
+  </documentManagement>
+</p:properties>
+</file>
+
 <file path=customXml/item3.xml><?xml version="1.0" encoding="utf-8"?>
 <?mso-contentType ?>
 <FormTemplates xmlns="http://schemas.microsoft.com/sharepoint/v3/contenttype/forms">
@@ -38185,23 +38849,6 @@
 </file>
 
 <file path=customXml/itemProps1.xml><?xml version="1.0" encoding="utf-8"?>
-<ds:datastoreItem xmlns:ds="http://schemas.openxmlformats.org/officeDocument/2006/customXml" ds:itemID="{CBDD27D0-5B6E-4A0E-95B2-BB37F9D88615}">
-  <ds:schemaRefs>
-    <ds:schemaRef ds:uri="http://purl.org/dc/dcmitype/"/>
-    <ds:schemaRef ds:uri="http://www.w3.org/XML/1998/namespace"/>
-    <ds:schemaRef ds:uri="http://schemas.openxmlformats.org/package/2006/metadata/core-properties"/>
-    <ds:schemaRef ds:uri="http://schemas.microsoft.com/office/2006/metadata/properties"/>
-    <ds:schemaRef ds:uri="http://purl.org/dc/elements/1.1/"/>
-    <ds:schemaRef ds:uri="http://schemas.microsoft.com/office/2006/documentManagement/types"/>
-    <ds:schemaRef ds:uri="http://purl.org/dc/terms/"/>
-    <ds:schemaRef ds:uri="http://schemas.microsoft.com/office/infopath/2007/PartnerControls"/>
-    <ds:schemaRef ds:uri="490ae867-905f-461a-953e-c60010c4e0c9"/>
-    <ds:schemaRef ds:uri="49ea7286-31dc-4857-8ba0-9dd5131121ba"/>
-  </ds:schemaRefs>
-</ds:datastoreItem>
-</file>
-
-<file path=customXml/itemProps2.xml><?xml version="1.0" encoding="utf-8"?>
 <ds:datastoreItem xmlns:ds="http://schemas.openxmlformats.org/officeDocument/2006/customXml" ds:itemID="{2772B1AE-A3BA-4700-8DCD-4A25B8D329B2}">
   <ds:schemaRefs>
     <ds:schemaRef ds:uri="http://schemas.microsoft.com/office/2006/metadata/contentType"/>
@@ -38220,6 +38867,23 @@
 </ds:datastoreItem>
 </file>
 
+<file path=customXml/itemProps2.xml><?xml version="1.0" encoding="utf-8"?>
+<ds:datastoreItem xmlns:ds="http://schemas.openxmlformats.org/officeDocument/2006/customXml" ds:itemID="{CBDD27D0-5B6E-4A0E-95B2-BB37F9D88615}">
+  <ds:schemaRefs>
+    <ds:schemaRef ds:uri="http://purl.org/dc/dcmitype/"/>
+    <ds:schemaRef ds:uri="http://www.w3.org/XML/1998/namespace"/>
+    <ds:schemaRef ds:uri="http://schemas.openxmlformats.org/package/2006/metadata/core-properties"/>
+    <ds:schemaRef ds:uri="http://schemas.microsoft.com/office/2006/metadata/properties"/>
+    <ds:schemaRef ds:uri="http://purl.org/dc/elements/1.1/"/>
+    <ds:schemaRef ds:uri="http://schemas.microsoft.com/office/2006/documentManagement/types"/>
+    <ds:schemaRef ds:uri="http://purl.org/dc/terms/"/>
+    <ds:schemaRef ds:uri="http://schemas.microsoft.com/office/infopath/2007/PartnerControls"/>
+    <ds:schemaRef ds:uri="490ae867-905f-461a-953e-c60010c4e0c9"/>
+    <ds:schemaRef ds:uri="49ea7286-31dc-4857-8ba0-9dd5131121ba"/>
+  </ds:schemaRefs>
+</ds:datastoreItem>
+</file>
+
 <file path=customXml/itemProps3.xml><?xml version="1.0" encoding="utf-8"?>
 <ds:datastoreItem xmlns:ds="http://schemas.openxmlformats.org/officeDocument/2006/customXml" ds:itemID="{A98CD342-50C4-441F-B4A3-7D5ADB057132}">
   <ds:schemaRefs>

</xml_diff>